<commit_message>
upload individual, acta cierre
</commit_message>
<xml_diff>
--- a/fase 3/Evidencias Grupales/Presentación Final del proyecto (Español).pptx
+++ b/fase 3/Evidencias Grupales/Presentación Final del proyecto (Español).pptx
@@ -2,28 +2,28 @@
 <file path=ppt/presentation.xml><?xml version="1.0" encoding="utf-8"?>
 <p:presentation xmlns:a="http://schemas.openxmlformats.org/drawingml/2006/main" xmlns:r="http://schemas.openxmlformats.org/officeDocument/2006/relationships" xmlns:mc="http://schemas.openxmlformats.org/markup-compatibility/2006" xmlns:mv="urn:schemas-microsoft-com:mac:vml" xmlns:p="http://schemas.openxmlformats.org/presentationml/2006/main" xmlns:c="http://schemas.openxmlformats.org/drawingml/2006/chart" xmlns:dgm="http://schemas.openxmlformats.org/drawingml/2006/diagram" xmlns:o="urn:schemas-microsoft-com:office:office" xmlns:v="urn:schemas-microsoft-com:vml" xmlns:pvml="urn:schemas-microsoft-com:office:powerpoint" xmlns:com="http://schemas.openxmlformats.org/drawingml/2006/compatibility" xmlns:p14="http://schemas.microsoft.com/office/powerpoint/2010/main" xmlns:p15="http://schemas.microsoft.com/office/powerpoint/2012/main" xmlns:ahyp="http://schemas.microsoft.com/office/drawing/2018/hyperlinkcolor" autoCompressPictures="0" strictFirstAndLastChars="0" saveSubsetFonts="1">
   <p:sldMasterIdLst>
-    <p:sldMasterId id="2147483648" r:id="rId4"/>
+    <p:sldMasterId id="2147483648" r:id="rId5"/>
   </p:sldMasterIdLst>
   <p:notesMasterIdLst>
-    <p:notesMasterId r:id="rId5"/>
+    <p:notesMasterId r:id="rId6"/>
   </p:notesMasterIdLst>
   <p:sldIdLst>
-    <p:sldId id="256" r:id="rId6"/>
-    <p:sldId id="257" r:id="rId7"/>
-    <p:sldId id="258" r:id="rId8"/>
-    <p:sldId id="259" r:id="rId9"/>
-    <p:sldId id="260" r:id="rId10"/>
-    <p:sldId id="261" r:id="rId11"/>
-    <p:sldId id="262" r:id="rId12"/>
-    <p:sldId id="263" r:id="rId13"/>
-    <p:sldId id="264" r:id="rId14"/>
-    <p:sldId id="265" r:id="rId15"/>
-    <p:sldId id="266" r:id="rId16"/>
-    <p:sldId id="267" r:id="rId17"/>
-    <p:sldId id="268" r:id="rId18"/>
-    <p:sldId id="269" r:id="rId19"/>
-    <p:sldId id="270" r:id="rId20"/>
-    <p:sldId id="271" r:id="rId21"/>
+    <p:sldId id="256" r:id="rId7"/>
+    <p:sldId id="257" r:id="rId8"/>
+    <p:sldId id="258" r:id="rId9"/>
+    <p:sldId id="259" r:id="rId10"/>
+    <p:sldId id="260" r:id="rId11"/>
+    <p:sldId id="261" r:id="rId12"/>
+    <p:sldId id="262" r:id="rId13"/>
+    <p:sldId id="263" r:id="rId14"/>
+    <p:sldId id="264" r:id="rId15"/>
+    <p:sldId id="265" r:id="rId16"/>
+    <p:sldId id="266" r:id="rId17"/>
+    <p:sldId id="267" r:id="rId18"/>
+    <p:sldId id="268" r:id="rId19"/>
+    <p:sldId id="269" r:id="rId20"/>
+    <p:sldId id="270" r:id="rId21"/>
+    <p:sldId id="271" r:id="rId22"/>
   </p:sldIdLst>
   <p:sldSz cy="11309350" cx="20104100"/>
   <p:notesSz cx="20104100" cy="11309350"/>
@@ -272,10 +272,33 @@
       </p15:sldGuideLst>
     </p:ext>
     <p:ext uri="GoogleSlidesCustomDataVersion2">
-      <go:slidesCustomData xmlns:go="http://customooxmlschemas.google.com/" r:id="rId22" roundtripDataSignature="AMtx7mglwjGfXqOUmxXPnQdlss9ds/lbBg=="/>
+      <go:slidesCustomData xmlns:go="http://customooxmlschemas.google.com/" r:id="rId23" roundtripDataSignature="AMtx7mjBoP2oHb9xx/lp0T4rXimeV4lv5Q=="/>
     </p:ext>
   </p:extLst>
 </p:presentation>
+</file>
+
+<file path=ppt/commentAuthors.xml><?xml version="1.0" encoding="utf-8"?>
+<p:cmAuthorLst xmlns:a="http://schemas.openxmlformats.org/drawingml/2006/main" xmlns:r="http://schemas.openxmlformats.org/officeDocument/2006/relationships" xmlns:mc="http://schemas.openxmlformats.org/markup-compatibility/2006" xmlns:mv="urn:schemas-microsoft-com:mac:vml" xmlns:p="http://schemas.openxmlformats.org/presentationml/2006/main" xmlns:c="http://schemas.openxmlformats.org/drawingml/2006/chart" xmlns:dgm="http://schemas.openxmlformats.org/drawingml/2006/diagram" xmlns:o="urn:schemas-microsoft-com:office:office" xmlns:v="urn:schemas-microsoft-com:vml" xmlns:pvml="urn:schemas-microsoft-com:office:powerpoint" xmlns:com="http://schemas.openxmlformats.org/drawingml/2006/compatibility" xmlns:p14="http://schemas.microsoft.com/office/powerpoint/2010/main" xmlns:p15="http://schemas.microsoft.com/office/powerpoint/2012/main" xmlns:ahyp="http://schemas.microsoft.com/office/drawing/2018/hyperlinkcolor">
+  <p:cmAuthor clrIdx="0" id="0" initials="" lastIdx="1" name="ALEJANDRO . VASQUEZ GONZALEZ"/>
+</p:cmAuthorLst>
+</file>
+
+<file path=ppt/comments/comment1.xml><?xml version="1.0" encoding="utf-8"?>
+<p:cmLst xmlns:a="http://schemas.openxmlformats.org/drawingml/2006/main" xmlns:r="http://schemas.openxmlformats.org/officeDocument/2006/relationships" xmlns:mc="http://schemas.openxmlformats.org/markup-compatibility/2006" xmlns:mv="urn:schemas-microsoft-com:mac:vml" xmlns:p="http://schemas.openxmlformats.org/presentationml/2006/main" xmlns:c="http://schemas.openxmlformats.org/drawingml/2006/chart" xmlns:dgm="http://schemas.openxmlformats.org/drawingml/2006/diagram" xmlns:o="urn:schemas-microsoft-com:office:office" xmlns:v="urn:schemas-microsoft-com:vml" xmlns:pvml="urn:schemas-microsoft-com:office:powerpoint" xmlns:com="http://schemas.openxmlformats.org/drawingml/2006/compatibility" xmlns:p14="http://schemas.microsoft.com/office/powerpoint/2010/main" xmlns:p15="http://schemas.microsoft.com/office/powerpoint/2012/main" xmlns:ahyp="http://schemas.microsoft.com/office/drawing/2018/hyperlinkcolor">
+  <p:cm authorId="0" idx="1" dt="2024-11-27T15:21:33.328">
+    <p:pos x="6000" y="0"/>
+    <p:text>Añadir nuevo carta gantt</p:text>
+    <p:extLst>
+      <p:ext uri="{C676402C-5697-4E1C-873F-D02D1690AC5C}">
+        <p15:threadingInfo timeZoneBias="0"/>
+      </p:ext>
+      <p:ext uri="http://customooxmlschemas.google.com/">
+        <go:slidesCustomData xmlns:go="http://customooxmlschemas.google.com/" commentPostId="AAABZdPPRoc"/>
+      </p:ext>
+    </p:extLst>
+  </p:cm>
+</p:cmLst>
 </file>
 
 <file path=ppt/notesMasters/notesMaster1.xml><?xml version="1.0" encoding="utf-8"?>
@@ -808,7 +831,7 @@
   <p:cSld>
     <p:spTree>
       <p:nvGrpSpPr>
-        <p:cNvPr id="281" name="Shape 281"/>
+        <p:cNvPr id="284" name="Shape 284"/>
         <p:cNvGrpSpPr/>
         <p:nvPr/>
       </p:nvGrpSpPr>
@@ -822,7 +845,7 @@
       </p:grpSpPr>
       <p:sp>
         <p:nvSpPr>
-          <p:cNvPr id="282" name="Google Shape;282;g31978c02ff3_0_315:notes"/>
+          <p:cNvPr id="285" name="Google Shape;285;g31978c02ff3_0_315:notes"/>
           <p:cNvSpPr txBox="1"/>
           <p:nvPr>
             <p:ph idx="1" type="body"/>
@@ -861,7 +884,7 @@
       </p:sp>
       <p:sp>
         <p:nvSpPr>
-          <p:cNvPr id="283" name="Google Shape;283;g31978c02ff3_0_315:notes"/>
+          <p:cNvPr id="286" name="Google Shape;286;g31978c02ff3_0_315:notes"/>
           <p:cNvSpPr/>
           <p:nvPr>
             <p:ph idx="2" type="sldImg"/>
@@ -907,7 +930,7 @@
   <p:cSld>
     <p:spTree>
       <p:nvGrpSpPr>
-        <p:cNvPr id="287" name="Shape 287"/>
+        <p:cNvPr id="290" name="Shape 290"/>
         <p:cNvGrpSpPr/>
         <p:nvPr/>
       </p:nvGrpSpPr>
@@ -921,7 +944,7 @@
       </p:grpSpPr>
       <p:sp>
         <p:nvSpPr>
-          <p:cNvPr id="288" name="Google Shape;288;g31978c02ff3_0_336:notes"/>
+          <p:cNvPr id="291" name="Google Shape;291;g31978c02ff3_0_336:notes"/>
           <p:cNvSpPr txBox="1"/>
           <p:nvPr>
             <p:ph idx="1" type="body"/>
@@ -960,7 +983,7 @@
       </p:sp>
       <p:sp>
         <p:nvSpPr>
-          <p:cNvPr id="289" name="Google Shape;289;g31978c02ff3_0_336:notes"/>
+          <p:cNvPr id="292" name="Google Shape;292;g31978c02ff3_0_336:notes"/>
           <p:cNvSpPr/>
           <p:nvPr>
             <p:ph idx="2" type="sldImg"/>
@@ -1006,7 +1029,7 @@
   <p:cSld>
     <p:spTree>
       <p:nvGrpSpPr>
-        <p:cNvPr id="300" name="Shape 300"/>
+        <p:cNvPr id="303" name="Shape 303"/>
         <p:cNvGrpSpPr/>
         <p:nvPr/>
       </p:nvGrpSpPr>
@@ -1020,7 +1043,7 @@
       </p:grpSpPr>
       <p:sp>
         <p:nvSpPr>
-          <p:cNvPr id="301" name="Google Shape;301;g31978c02ff3_0_299:notes"/>
+          <p:cNvPr id="304" name="Google Shape;304;g31978c02ff3_0_299:notes"/>
           <p:cNvSpPr txBox="1"/>
           <p:nvPr>
             <p:ph idx="1" type="body"/>
@@ -1059,7 +1082,7 @@
       </p:sp>
       <p:sp>
         <p:nvSpPr>
-          <p:cNvPr id="302" name="Google Shape;302;g31978c02ff3_0_299:notes"/>
+          <p:cNvPr id="305" name="Google Shape;305;g31978c02ff3_0_299:notes"/>
           <p:cNvSpPr/>
           <p:nvPr>
             <p:ph idx="2" type="sldImg"/>
@@ -1105,7 +1128,7 @@
   <p:cSld>
     <p:spTree>
       <p:nvGrpSpPr>
-        <p:cNvPr id="306" name="Shape 306"/>
+        <p:cNvPr id="309" name="Shape 309"/>
         <p:cNvGrpSpPr/>
         <p:nvPr/>
       </p:nvGrpSpPr>
@@ -1119,7 +1142,7 @@
       </p:grpSpPr>
       <p:sp>
         <p:nvSpPr>
-          <p:cNvPr id="307" name="Google Shape;307;g31978c02ff3_0_464:notes"/>
+          <p:cNvPr id="310" name="Google Shape;310;g31978c02ff3_0_464:notes"/>
           <p:cNvSpPr txBox="1"/>
           <p:nvPr>
             <p:ph idx="1" type="body"/>
@@ -1158,7 +1181,7 @@
       </p:sp>
       <p:sp>
         <p:nvSpPr>
-          <p:cNvPr id="308" name="Google Shape;308;g31978c02ff3_0_464:notes"/>
+          <p:cNvPr id="311" name="Google Shape;311;g31978c02ff3_0_464:notes"/>
           <p:cNvSpPr/>
           <p:nvPr>
             <p:ph idx="2" type="sldImg"/>
@@ -1204,7 +1227,7 @@
   <p:cSld>
     <p:spTree>
       <p:nvGrpSpPr>
-        <p:cNvPr id="312" name="Shape 312"/>
+        <p:cNvPr id="315" name="Shape 315"/>
         <p:cNvGrpSpPr/>
         <p:nvPr/>
       </p:nvGrpSpPr>
@@ -1218,7 +1241,7 @@
       </p:grpSpPr>
       <p:sp>
         <p:nvSpPr>
-          <p:cNvPr id="313" name="Google Shape;313;g31978c02ff3_0_354:notes"/>
+          <p:cNvPr id="316" name="Google Shape;316;g31978c02ff3_0_354:notes"/>
           <p:cNvSpPr txBox="1"/>
           <p:nvPr>
             <p:ph idx="1" type="body"/>
@@ -1257,7 +1280,7 @@
       </p:sp>
       <p:sp>
         <p:nvSpPr>
-          <p:cNvPr id="314" name="Google Shape;314;g31978c02ff3_0_354:notes"/>
+          <p:cNvPr id="317" name="Google Shape;317;g31978c02ff3_0_354:notes"/>
           <p:cNvSpPr/>
           <p:nvPr>
             <p:ph idx="2" type="sldImg"/>
@@ -1303,7 +1326,7 @@
   <p:cSld>
     <p:spTree>
       <p:nvGrpSpPr>
-        <p:cNvPr id="325" name="Shape 325"/>
+        <p:cNvPr id="328" name="Shape 328"/>
         <p:cNvGrpSpPr/>
         <p:nvPr/>
       </p:nvGrpSpPr>
@@ -1317,7 +1340,7 @@
       </p:grpSpPr>
       <p:sp>
         <p:nvSpPr>
-          <p:cNvPr id="326" name="Google Shape;326;g31978c02ff3_0_536:notes"/>
+          <p:cNvPr id="329" name="Google Shape;329;g319a528b75e_1_27:notes"/>
           <p:cNvSpPr txBox="1"/>
           <p:nvPr>
             <p:ph idx="1" type="body"/>
@@ -1356,7 +1379,7 @@
       </p:sp>
       <p:sp>
         <p:nvSpPr>
-          <p:cNvPr id="327" name="Google Shape;327;g31978c02ff3_0_536:notes"/>
+          <p:cNvPr id="330" name="Google Shape;330;g319a528b75e_1_27:notes"/>
           <p:cNvSpPr/>
           <p:nvPr>
             <p:ph idx="2" type="sldImg"/>
@@ -1402,7 +1425,7 @@
   <p:cSld>
     <p:spTree>
       <p:nvGrpSpPr>
-        <p:cNvPr id="331" name="Shape 331"/>
+        <p:cNvPr id="334" name="Shape 334"/>
         <p:cNvGrpSpPr/>
         <p:nvPr/>
       </p:nvGrpSpPr>
@@ -1416,7 +1439,7 @@
       </p:grpSpPr>
       <p:sp>
         <p:nvSpPr>
-          <p:cNvPr id="332" name="Google Shape;332;g319a528b75e_1_27:notes"/>
+          <p:cNvPr id="335" name="Google Shape;335;g31978c02ff3_0_536:notes"/>
           <p:cNvSpPr txBox="1"/>
           <p:nvPr>
             <p:ph idx="1" type="body"/>
@@ -1455,7 +1478,7 @@
       </p:sp>
       <p:sp>
         <p:nvSpPr>
-          <p:cNvPr id="333" name="Google Shape;333;g319a528b75e_1_27:notes"/>
+          <p:cNvPr id="336" name="Google Shape;336;g31978c02ff3_0_536:notes"/>
           <p:cNvSpPr/>
           <p:nvPr>
             <p:ph idx="2" type="sldImg"/>
@@ -1600,7 +1623,7 @@
   <p:cSld>
     <p:spTree>
       <p:nvGrpSpPr>
-        <p:cNvPr id="218" name="Shape 218"/>
+        <p:cNvPr id="220" name="Shape 220"/>
         <p:cNvGrpSpPr/>
         <p:nvPr/>
       </p:nvGrpSpPr>
@@ -1614,7 +1637,7 @@
       </p:grpSpPr>
       <p:sp>
         <p:nvSpPr>
-          <p:cNvPr id="219" name="Google Shape;219;g319a528b75e_1_7:notes"/>
+          <p:cNvPr id="221" name="Google Shape;221;g319a528b75e_1_7:notes"/>
           <p:cNvSpPr txBox="1"/>
           <p:nvPr>
             <p:ph idx="1" type="body"/>
@@ -1653,7 +1676,7 @@
       </p:sp>
       <p:sp>
         <p:nvSpPr>
-          <p:cNvPr id="220" name="Google Shape;220;g319a528b75e_1_7:notes"/>
+          <p:cNvPr id="222" name="Google Shape;222;g319a528b75e_1_7:notes"/>
           <p:cNvSpPr/>
           <p:nvPr>
             <p:ph idx="2" type="sldImg"/>
@@ -1699,7 +1722,7 @@
   <p:cSld>
     <p:spTree>
       <p:nvGrpSpPr>
-        <p:cNvPr id="226" name="Shape 226"/>
+        <p:cNvPr id="228" name="Shape 228"/>
         <p:cNvGrpSpPr/>
         <p:nvPr/>
       </p:nvGrpSpPr>
@@ -1713,7 +1736,7 @@
       </p:grpSpPr>
       <p:sp>
         <p:nvSpPr>
-          <p:cNvPr id="227" name="Google Shape;227;g31978c02ff3_0_331:notes"/>
+          <p:cNvPr id="229" name="Google Shape;229;g31978c02ff3_0_331:notes"/>
           <p:cNvSpPr txBox="1"/>
           <p:nvPr>
             <p:ph idx="1" type="body"/>
@@ -1752,7 +1775,7 @@
       </p:sp>
       <p:sp>
         <p:nvSpPr>
-          <p:cNvPr id="228" name="Google Shape;228;g31978c02ff3_0_331:notes"/>
+          <p:cNvPr id="230" name="Google Shape;230;g31978c02ff3_0_331:notes"/>
           <p:cNvSpPr/>
           <p:nvPr>
             <p:ph idx="2" type="sldImg"/>
@@ -1798,7 +1821,7 @@
   <p:cSld>
     <p:spTree>
       <p:nvGrpSpPr>
-        <p:cNvPr id="232" name="Shape 232"/>
+        <p:cNvPr id="234" name="Shape 234"/>
         <p:cNvGrpSpPr/>
         <p:nvPr/>
       </p:nvGrpSpPr>
@@ -1812,7 +1835,7 @@
       </p:grpSpPr>
       <p:sp>
         <p:nvSpPr>
-          <p:cNvPr id="233" name="Google Shape;233;g319a528b75e_1_16:notes"/>
+          <p:cNvPr id="235" name="Google Shape;235;g319a528b75e_1_16:notes"/>
           <p:cNvSpPr txBox="1"/>
           <p:nvPr>
             <p:ph idx="1" type="body"/>
@@ -1851,7 +1874,7 @@
       </p:sp>
       <p:sp>
         <p:nvSpPr>
-          <p:cNvPr id="234" name="Google Shape;234;g319a528b75e_1_16:notes"/>
+          <p:cNvPr id="236" name="Google Shape;236;g319a528b75e_1_16:notes"/>
           <p:cNvSpPr/>
           <p:nvPr>
             <p:ph idx="2" type="sldImg"/>
@@ -1897,7 +1920,7 @@
   <p:cSld>
     <p:spTree>
       <p:nvGrpSpPr>
-        <p:cNvPr id="243" name="Shape 243"/>
+        <p:cNvPr id="245" name="Shape 245"/>
         <p:cNvGrpSpPr/>
         <p:nvPr/>
       </p:nvGrpSpPr>
@@ -1911,7 +1934,7 @@
       </p:grpSpPr>
       <p:sp>
         <p:nvSpPr>
-          <p:cNvPr id="244" name="Google Shape;244;g31978c02ff3_0_322:notes"/>
+          <p:cNvPr id="246" name="Google Shape;246;g31978c02ff3_0_322:notes"/>
           <p:cNvSpPr txBox="1"/>
           <p:nvPr>
             <p:ph idx="1" type="body"/>
@@ -1950,7 +1973,7 @@
       </p:sp>
       <p:sp>
         <p:nvSpPr>
-          <p:cNvPr id="245" name="Google Shape;245;g31978c02ff3_0_322:notes"/>
+          <p:cNvPr id="247" name="Google Shape;247;g31978c02ff3_0_322:notes"/>
           <p:cNvSpPr/>
           <p:nvPr>
             <p:ph idx="2" type="sldImg"/>
@@ -1996,7 +2019,7 @@
   <p:cSld>
     <p:spTree>
       <p:nvGrpSpPr>
-        <p:cNvPr id="249" name="Shape 249"/>
+        <p:cNvPr id="251" name="Shape 251"/>
         <p:cNvGrpSpPr/>
         <p:nvPr/>
       </p:nvGrpSpPr>
@@ -2010,7 +2033,7 @@
       </p:grpSpPr>
       <p:sp>
         <p:nvSpPr>
-          <p:cNvPr id="250" name="Google Shape;250;g31978c02ff3_0_221:notes"/>
+          <p:cNvPr id="252" name="Google Shape;252;g31978c02ff3_0_221:notes"/>
           <p:cNvSpPr txBox="1"/>
           <p:nvPr>
             <p:ph idx="1" type="body"/>
@@ -2049,7 +2072,7 @@
       </p:sp>
       <p:sp>
         <p:nvSpPr>
-          <p:cNvPr id="251" name="Google Shape;251;g31978c02ff3_0_221:notes"/>
+          <p:cNvPr id="253" name="Google Shape;253;g31978c02ff3_0_221:notes"/>
           <p:cNvSpPr/>
           <p:nvPr>
             <p:ph idx="2" type="sldImg"/>
@@ -2095,7 +2118,7 @@
   <p:cSld>
     <p:spTree>
       <p:nvGrpSpPr>
-        <p:cNvPr id="255" name="Shape 255"/>
+        <p:cNvPr id="257" name="Shape 257"/>
         <p:cNvGrpSpPr/>
         <p:nvPr/>
       </p:nvGrpSpPr>
@@ -2109,7 +2132,7 @@
       </p:grpSpPr>
       <p:sp>
         <p:nvSpPr>
-          <p:cNvPr id="256" name="Google Shape;256;g31978c02ff3_0_277:notes"/>
+          <p:cNvPr id="258" name="Google Shape;258;g31978c02ff3_0_277:notes"/>
           <p:cNvSpPr txBox="1"/>
           <p:nvPr>
             <p:ph idx="1" type="body"/>
@@ -2148,7 +2171,7 @@
       </p:sp>
       <p:sp>
         <p:nvSpPr>
-          <p:cNvPr id="257" name="Google Shape;257;g31978c02ff3_0_277:notes"/>
+          <p:cNvPr id="259" name="Google Shape;259;g31978c02ff3_0_277:notes"/>
           <p:cNvSpPr/>
           <p:nvPr>
             <p:ph idx="2" type="sldImg"/>
@@ -2194,7 +2217,7 @@
   <p:cSld>
     <p:spTree>
       <p:nvGrpSpPr>
-        <p:cNvPr id="274" name="Shape 274"/>
+        <p:cNvPr id="277" name="Shape 277"/>
         <p:cNvGrpSpPr/>
         <p:nvPr/>
       </p:nvGrpSpPr>
@@ -2208,7 +2231,7 @@
       </p:grpSpPr>
       <p:sp>
         <p:nvSpPr>
-          <p:cNvPr id="275" name="Google Shape;275;g31978c02ff3_0_245:notes"/>
+          <p:cNvPr id="278" name="Google Shape;278;g31978c02ff3_0_245:notes"/>
           <p:cNvSpPr txBox="1"/>
           <p:nvPr>
             <p:ph idx="1" type="body"/>
@@ -2247,7 +2270,7 @@
       </p:sp>
       <p:sp>
         <p:nvSpPr>
-          <p:cNvPr id="276" name="Google Shape;276;g31978c02ff3_0_245:notes"/>
+          <p:cNvPr id="279" name="Google Shape;279;g31978c02ff3_0_245:notes"/>
           <p:cNvSpPr/>
           <p:nvPr>
             <p:ph idx="2" type="sldImg"/>
@@ -23226,7 +23249,7 @@
   <p:cSld>
     <p:spTree>
       <p:nvGrpSpPr>
-        <p:cNvPr id="284" name="Shape 284"/>
+        <p:cNvPr id="287" name="Shape 287"/>
         <p:cNvGrpSpPr/>
         <p:nvPr/>
       </p:nvGrpSpPr>
@@ -23240,7 +23263,7 @@
       </p:grpSpPr>
       <p:sp>
         <p:nvSpPr>
-          <p:cNvPr id="285" name="Google Shape;285;g31978c02ff3_0_315"/>
+          <p:cNvPr id="288" name="Google Shape;288;g31978c02ff3_0_315"/>
           <p:cNvSpPr txBox="1"/>
           <p:nvPr>
             <p:ph idx="1" type="body"/>
@@ -23284,7 +23307,7 @@
       </p:sp>
       <p:pic>
         <p:nvPicPr>
-          <p:cNvPr id="286" name="Google Shape;286;g31978c02ff3_0_315"/>
+          <p:cNvPr id="289" name="Google Shape;289;g31978c02ff3_0_315"/>
           <p:cNvPicPr preferRelativeResize="0"/>
           <p:nvPr/>
         </p:nvPicPr>
@@ -23322,7 +23345,7 @@
   <p:cSld>
     <p:spTree>
       <p:nvGrpSpPr>
-        <p:cNvPr id="290" name="Shape 290"/>
+        <p:cNvPr id="293" name="Shape 293"/>
         <p:cNvGrpSpPr/>
         <p:nvPr/>
       </p:nvGrpSpPr>
@@ -23336,7 +23359,7 @@
       </p:grpSpPr>
       <p:sp>
         <p:nvSpPr>
-          <p:cNvPr id="291" name="Google Shape;291;g31978c02ff3_0_336"/>
+          <p:cNvPr id="294" name="Google Shape;294;g31978c02ff3_0_336"/>
           <p:cNvSpPr txBox="1"/>
           <p:nvPr>
             <p:ph idx="1" type="body"/>
@@ -23380,7 +23403,7 @@
       </p:sp>
       <p:sp>
         <p:nvSpPr>
-          <p:cNvPr id="292" name="Google Shape;292;g31978c02ff3_0_336"/>
+          <p:cNvPr id="295" name="Google Shape;295;g31978c02ff3_0_336"/>
           <p:cNvSpPr txBox="1"/>
           <p:nvPr>
             <p:ph idx="3" type="body"/>
@@ -23424,7 +23447,7 @@
       </p:sp>
       <p:sp>
         <p:nvSpPr>
-          <p:cNvPr id="293" name="Google Shape;293;g31978c02ff3_0_336"/>
+          <p:cNvPr id="296" name="Google Shape;296;g31978c02ff3_0_336"/>
           <p:cNvSpPr txBox="1"/>
           <p:nvPr>
             <p:ph idx="4" type="body"/>
@@ -23472,7 +23495,7 @@
       </p:sp>
       <p:sp>
         <p:nvSpPr>
-          <p:cNvPr id="294" name="Google Shape;294;g31978c02ff3_0_336"/>
+          <p:cNvPr id="297" name="Google Shape;297;g31978c02ff3_0_336"/>
           <p:cNvSpPr txBox="1"/>
           <p:nvPr>
             <p:ph idx="6" type="body"/>
@@ -23520,7 +23543,7 @@
       </p:sp>
       <p:sp>
         <p:nvSpPr>
-          <p:cNvPr id="295" name="Google Shape;295;g31978c02ff3_0_336"/>
+          <p:cNvPr id="298" name="Google Shape;298;g31978c02ff3_0_336"/>
           <p:cNvSpPr txBox="1"/>
           <p:nvPr>
             <p:ph idx="7" type="body"/>
@@ -23564,7 +23587,7 @@
       </p:sp>
       <p:sp>
         <p:nvSpPr>
-          <p:cNvPr id="296" name="Google Shape;296;g31978c02ff3_0_336"/>
+          <p:cNvPr id="299" name="Google Shape;299;g31978c02ff3_0_336"/>
           <p:cNvSpPr txBox="1"/>
           <p:nvPr>
             <p:ph idx="9" type="body"/>
@@ -23608,7 +23631,7 @@
       </p:sp>
       <p:sp>
         <p:nvSpPr>
-          <p:cNvPr id="297" name="Google Shape;297;g31978c02ff3_0_336"/>
+          <p:cNvPr id="300" name="Google Shape;300;g31978c02ff3_0_336"/>
           <p:cNvSpPr txBox="1"/>
           <p:nvPr>
             <p:ph idx="13" type="body"/>
@@ -23660,7 +23683,7 @@
       </p:sp>
       <p:sp>
         <p:nvSpPr>
-          <p:cNvPr id="298" name="Google Shape;298;g31978c02ff3_0_336"/>
+          <p:cNvPr id="301" name="Google Shape;301;g31978c02ff3_0_336"/>
           <p:cNvSpPr txBox="1"/>
           <p:nvPr>
             <p:ph idx="15" type="body"/>
@@ -23696,7 +23719,7 @@
             </a:pPr>
             <a:r>
               <a:rPr lang="es-CL"/>
-              <a:t>Las </a:t>
+              <a:t>La </a:t>
             </a:r>
             <a:r>
               <a:rPr lang="es-CL"/>
@@ -23720,7 +23743,7 @@
       </p:sp>
       <p:sp>
         <p:nvSpPr>
-          <p:cNvPr id="299" name="Google Shape;299;g31978c02ff3_0_336"/>
+          <p:cNvPr id="302" name="Google Shape;302;g31978c02ff3_0_336"/>
           <p:cNvSpPr txBox="1"/>
           <p:nvPr>
             <p:ph idx="4294967295" type="title"/>
@@ -23775,7 +23798,7 @@
   <p:cSld>
     <p:spTree>
       <p:nvGrpSpPr>
-        <p:cNvPr id="303" name="Shape 303"/>
+        <p:cNvPr id="306" name="Shape 306"/>
         <p:cNvGrpSpPr/>
         <p:nvPr/>
       </p:nvGrpSpPr>
@@ -23789,7 +23812,7 @@
       </p:grpSpPr>
       <p:sp>
         <p:nvSpPr>
-          <p:cNvPr id="304" name="Google Shape;304;g31978c02ff3_0_299"/>
+          <p:cNvPr id="307" name="Google Shape;307;g31978c02ff3_0_299"/>
           <p:cNvSpPr txBox="1"/>
           <p:nvPr>
             <p:ph idx="1" type="body"/>
@@ -23833,7 +23856,7 @@
       </p:sp>
       <p:pic>
         <p:nvPicPr>
-          <p:cNvPr id="305" name="Google Shape;305;g31978c02ff3_0_299"/>
+          <p:cNvPr id="308" name="Google Shape;308;g31978c02ff3_0_299"/>
           <p:cNvPicPr preferRelativeResize="0"/>
           <p:nvPr/>
         </p:nvPicPr>
@@ -23872,7 +23895,7 @@
   <p:cSld>
     <p:spTree>
       <p:nvGrpSpPr>
-        <p:cNvPr id="309" name="Shape 309"/>
+        <p:cNvPr id="312" name="Shape 312"/>
         <p:cNvGrpSpPr/>
         <p:nvPr/>
       </p:nvGrpSpPr>
@@ -23886,7 +23909,7 @@
       </p:grpSpPr>
       <p:sp>
         <p:nvSpPr>
-          <p:cNvPr id="310" name="Google Shape;310;g31978c02ff3_0_464"/>
+          <p:cNvPr id="313" name="Google Shape;313;g31978c02ff3_0_464"/>
           <p:cNvSpPr txBox="1"/>
           <p:nvPr>
             <p:ph idx="1" type="body"/>
@@ -23930,7 +23953,7 @@
       </p:sp>
       <p:sp>
         <p:nvSpPr>
-          <p:cNvPr id="311" name="Google Shape;311;g31978c02ff3_0_464"/>
+          <p:cNvPr id="314" name="Google Shape;314;g31978c02ff3_0_464"/>
           <p:cNvSpPr txBox="1"/>
           <p:nvPr/>
         </p:nvSpPr>
@@ -24098,7 +24121,7 @@
   <p:cSld>
     <p:spTree>
       <p:nvGrpSpPr>
-        <p:cNvPr id="315" name="Shape 315"/>
+        <p:cNvPr id="318" name="Shape 318"/>
         <p:cNvGrpSpPr/>
         <p:nvPr/>
       </p:nvGrpSpPr>
@@ -24112,7 +24135,7 @@
       </p:grpSpPr>
       <p:sp>
         <p:nvSpPr>
-          <p:cNvPr id="316" name="Google Shape;316;g31978c02ff3_0_354"/>
+          <p:cNvPr id="319" name="Google Shape;319;g31978c02ff3_0_354"/>
           <p:cNvSpPr txBox="1"/>
           <p:nvPr>
             <p:ph idx="1" type="body"/>
@@ -24156,7 +24179,7 @@
       </p:sp>
       <p:sp>
         <p:nvSpPr>
-          <p:cNvPr id="317" name="Google Shape;317;g31978c02ff3_0_354"/>
+          <p:cNvPr id="320" name="Google Shape;320;g31978c02ff3_0_354"/>
           <p:cNvSpPr txBox="1"/>
           <p:nvPr>
             <p:ph idx="3" type="body"/>
@@ -24254,7 +24277,7 @@
       </p:sp>
       <p:sp>
         <p:nvSpPr>
-          <p:cNvPr id="318" name="Google Shape;318;g31978c02ff3_0_354"/>
+          <p:cNvPr id="321" name="Google Shape;321;g31978c02ff3_0_354"/>
           <p:cNvSpPr txBox="1"/>
           <p:nvPr>
             <p:ph idx="4" type="body"/>
@@ -24298,7 +24321,7 @@
       </p:sp>
       <p:sp>
         <p:nvSpPr>
-          <p:cNvPr id="319" name="Google Shape;319;g31978c02ff3_0_354"/>
+          <p:cNvPr id="322" name="Google Shape;322;g31978c02ff3_0_354"/>
           <p:cNvSpPr txBox="1"/>
           <p:nvPr>
             <p:ph idx="7" type="body"/>
@@ -24342,7 +24365,7 @@
       </p:sp>
       <p:sp>
         <p:nvSpPr>
-          <p:cNvPr id="320" name="Google Shape;320;g31978c02ff3_0_354"/>
+          <p:cNvPr id="323" name="Google Shape;323;g31978c02ff3_0_354"/>
           <p:cNvSpPr txBox="1"/>
           <p:nvPr>
             <p:ph idx="9" type="body"/>
@@ -24419,7 +24442,7 @@
       </p:sp>
       <p:sp>
         <p:nvSpPr>
-          <p:cNvPr id="321" name="Google Shape;321;g31978c02ff3_0_354"/>
+          <p:cNvPr id="324" name="Google Shape;324;g31978c02ff3_0_354"/>
           <p:cNvSpPr txBox="1"/>
           <p:nvPr>
             <p:ph idx="13" type="body"/>
@@ -24427,8 +24450,8 @@
         </p:nvSpPr>
         <p:spPr>
           <a:xfrm>
-            <a:off x="14618850" y="1807700"/>
-            <a:ext cx="3422100" cy="3879000"/>
+            <a:off x="14635500" y="2039400"/>
+            <a:ext cx="3422100" cy="3324900"/>
           </a:xfrm>
           <a:prstGeom prst="rect">
             <a:avLst/>
@@ -24454,8 +24477,16 @@
               <a:buNone/>
             </a:pPr>
             <a:r>
+              <a:rPr lang="es-CL">
+                <a:highlight>
+                  <a:schemeClr val="dk1"/>
+                </a:highlight>
+              </a:rPr>
+              <a:t>Falta de comunicación en el equipo durante el desarrollo del proyecto</a:t>
+            </a:r>
+            <a:r>
               <a:rPr lang="es-CL"/>
-              <a:t>Falta de transparencia en la comunicación sobre el progreso del proyecto.</a:t>
+              <a:t>.</a:t>
             </a:r>
             <a:endParaRPr/>
           </a:p>
@@ -24463,7 +24494,7 @@
       </p:sp>
       <p:sp>
         <p:nvSpPr>
-          <p:cNvPr id="322" name="Google Shape;322;g31978c02ff3_0_354"/>
+          <p:cNvPr id="325" name="Google Shape;325;g31978c02ff3_0_354"/>
           <p:cNvSpPr txBox="1"/>
           <p:nvPr>
             <p:ph idx="4294967295" type="title"/>
@@ -24507,7 +24538,7 @@
       </p:sp>
       <p:sp>
         <p:nvSpPr>
-          <p:cNvPr id="323" name="Google Shape;323;g31978c02ff3_0_354"/>
+          <p:cNvPr id="326" name="Google Shape;326;g31978c02ff3_0_354"/>
           <p:cNvSpPr txBox="1"/>
           <p:nvPr>
             <p:ph idx="3" type="body"/>
@@ -24605,7 +24636,7 @@
       </p:sp>
       <p:sp>
         <p:nvSpPr>
-          <p:cNvPr id="324" name="Google Shape;324;g31978c02ff3_0_354"/>
+          <p:cNvPr id="327" name="Google Shape;327;g31978c02ff3_0_354"/>
           <p:cNvSpPr txBox="1"/>
           <p:nvPr>
             <p:ph idx="3" type="body"/>
@@ -24714,7 +24745,7 @@
   <p:cSld>
     <p:spTree>
       <p:nvGrpSpPr>
-        <p:cNvPr id="328" name="Shape 328"/>
+        <p:cNvPr id="331" name="Shape 331"/>
         <p:cNvGrpSpPr/>
         <p:nvPr/>
       </p:nvGrpSpPr>
@@ -24728,7 +24759,120 @@
       </p:grpSpPr>
       <p:sp>
         <p:nvSpPr>
-          <p:cNvPr id="329" name="Google Shape;329;g31978c02ff3_0_536"/>
+          <p:cNvPr id="332" name="Google Shape;332;g319a528b75e_1_27"/>
+          <p:cNvSpPr txBox="1"/>
+          <p:nvPr>
+            <p:ph idx="1" type="body"/>
+          </p:nvPr>
+        </p:nvSpPr>
+        <p:spPr>
+          <a:xfrm>
+            <a:off x="8300446" y="9898295"/>
+            <a:ext cx="11193600" cy="461700"/>
+          </a:xfrm>
+          <a:prstGeom prst="rect">
+            <a:avLst/>
+          </a:prstGeom>
+          <a:noFill/>
+          <a:ln>
+            <a:noFill/>
+          </a:ln>
+        </p:spPr>
+        <p:txBody>
+          <a:bodyPr anchorCtr="0" anchor="t" bIns="0" lIns="0" spcFirstLastPara="1" rIns="0" wrap="square" tIns="0">
+            <a:spAutoFit/>
+          </a:bodyPr>
+          <a:lstStyle/>
+          <a:p>
+            <a:pPr indent="0" lvl="0" marL="0" rtl="0" algn="l">
+              <a:spcBef>
+                <a:spcPts val="0"/>
+              </a:spcBef>
+              <a:spcAft>
+                <a:spcPts val="0"/>
+              </a:spcAft>
+              <a:buNone/>
+            </a:pPr>
+            <a:r>
+              <a:rPr lang="es-CL" sz="3000"/>
+              <a:t>Muchas Gracias</a:t>
+            </a:r>
+            <a:endParaRPr sz="3000"/>
+          </a:p>
+        </p:txBody>
+      </p:sp>
+      <p:sp>
+        <p:nvSpPr>
+          <p:cNvPr id="333" name="Google Shape;333;g319a528b75e_1_27"/>
+          <p:cNvSpPr txBox="1"/>
+          <p:nvPr>
+            <p:ph type="title"/>
+          </p:nvPr>
+        </p:nvSpPr>
+        <p:spPr>
+          <a:xfrm>
+            <a:off x="1321990" y="8235994"/>
+            <a:ext cx="6048300" cy="831300"/>
+          </a:xfrm>
+          <a:prstGeom prst="rect">
+            <a:avLst/>
+          </a:prstGeom>
+          <a:noFill/>
+          <a:ln>
+            <a:noFill/>
+          </a:ln>
+        </p:spPr>
+        <p:txBody>
+          <a:bodyPr anchorCtr="0" anchor="t" bIns="0" lIns="0" spcFirstLastPara="1" rIns="0" wrap="square" tIns="0">
+            <a:spAutoFit/>
+          </a:bodyPr>
+          <a:lstStyle/>
+          <a:p>
+            <a:pPr indent="0" lvl="0" marL="0" rtl="0" algn="l">
+              <a:spcBef>
+                <a:spcPts val="0"/>
+              </a:spcBef>
+              <a:spcAft>
+                <a:spcPts val="0"/>
+              </a:spcAft>
+              <a:buNone/>
+            </a:pPr>
+            <a:r>
+              <a:rPr lang="es-CL"/>
+              <a:t>Conclusión</a:t>
+            </a:r>
+            <a:endParaRPr/>
+          </a:p>
+        </p:txBody>
+      </p:sp>
+    </p:spTree>
+  </p:cSld>
+  <p:clrMapOvr>
+    <a:masterClrMapping/>
+  </p:clrMapOvr>
+</p:sld>
+</file>
+
+<file path=ppt/slides/slide16.xml><?xml version="1.0" encoding="utf-8"?>
+<p:sld xmlns:a="http://schemas.openxmlformats.org/drawingml/2006/main" xmlns:r="http://schemas.openxmlformats.org/officeDocument/2006/relationships" xmlns:mc="http://schemas.openxmlformats.org/markup-compatibility/2006" xmlns:mv="urn:schemas-microsoft-com:mac:vml" xmlns:p="http://schemas.openxmlformats.org/presentationml/2006/main" xmlns:c="http://schemas.openxmlformats.org/drawingml/2006/chart" xmlns:dgm="http://schemas.openxmlformats.org/drawingml/2006/diagram" xmlns:o="urn:schemas-microsoft-com:office:office" xmlns:v="urn:schemas-microsoft-com:vml" xmlns:pvml="urn:schemas-microsoft-com:office:powerpoint" xmlns:com="http://schemas.openxmlformats.org/drawingml/2006/compatibility" xmlns:p14="http://schemas.microsoft.com/office/powerpoint/2010/main" xmlns:p15="http://schemas.microsoft.com/office/powerpoint/2012/main" xmlns:ahyp="http://schemas.microsoft.com/office/drawing/2018/hyperlinkcolor">
+  <p:cSld>
+    <p:spTree>
+      <p:nvGrpSpPr>
+        <p:cNvPr id="337" name="Shape 337"/>
+        <p:cNvGrpSpPr/>
+        <p:nvPr/>
+      </p:nvGrpSpPr>
+      <p:grpSpPr>
+        <a:xfrm>
+          <a:off x="0" y="0"/>
+          <a:ext cx="0" cy="0"/>
+          <a:chOff x="0" y="0"/>
+          <a:chExt cx="0" cy="0"/>
+        </a:xfrm>
+      </p:grpSpPr>
+      <p:sp>
+        <p:nvSpPr>
+          <p:cNvPr id="338" name="Google Shape;338;g31978c02ff3_0_536"/>
           <p:cNvSpPr txBox="1"/>
           <p:nvPr>
             <p:ph type="title"/>
@@ -24772,7 +24916,7 @@
       </p:sp>
       <p:sp>
         <p:nvSpPr>
-          <p:cNvPr id="330" name="Google Shape;330;g31978c02ff3_0_536"/>
+          <p:cNvPr id="339" name="Google Shape;339;g31978c02ff3_0_536"/>
           <p:cNvSpPr txBox="1"/>
           <p:nvPr>
             <p:ph idx="1" type="body"/>
@@ -24811,119 +24955,6 @@
               <a:t>Muchas Gracias</a:t>
             </a:r>
             <a:endParaRPr sz="3000"/>
-          </a:p>
-        </p:txBody>
-      </p:sp>
-    </p:spTree>
-  </p:cSld>
-  <p:clrMapOvr>
-    <a:masterClrMapping/>
-  </p:clrMapOvr>
-</p:sld>
-</file>
-
-<file path=ppt/slides/slide16.xml><?xml version="1.0" encoding="utf-8"?>
-<p:sld xmlns:a="http://schemas.openxmlformats.org/drawingml/2006/main" xmlns:r="http://schemas.openxmlformats.org/officeDocument/2006/relationships" xmlns:mc="http://schemas.openxmlformats.org/markup-compatibility/2006" xmlns:mv="urn:schemas-microsoft-com:mac:vml" xmlns:p="http://schemas.openxmlformats.org/presentationml/2006/main" xmlns:c="http://schemas.openxmlformats.org/drawingml/2006/chart" xmlns:dgm="http://schemas.openxmlformats.org/drawingml/2006/diagram" xmlns:o="urn:schemas-microsoft-com:office:office" xmlns:v="urn:schemas-microsoft-com:vml" xmlns:pvml="urn:schemas-microsoft-com:office:powerpoint" xmlns:com="http://schemas.openxmlformats.org/drawingml/2006/compatibility" xmlns:p14="http://schemas.microsoft.com/office/powerpoint/2010/main" xmlns:p15="http://schemas.microsoft.com/office/powerpoint/2012/main" xmlns:ahyp="http://schemas.microsoft.com/office/drawing/2018/hyperlinkcolor">
-  <p:cSld>
-    <p:spTree>
-      <p:nvGrpSpPr>
-        <p:cNvPr id="334" name="Shape 334"/>
-        <p:cNvGrpSpPr/>
-        <p:nvPr/>
-      </p:nvGrpSpPr>
-      <p:grpSpPr>
-        <a:xfrm>
-          <a:off x="0" y="0"/>
-          <a:ext cx="0" cy="0"/>
-          <a:chOff x="0" y="0"/>
-          <a:chExt cx="0" cy="0"/>
-        </a:xfrm>
-      </p:grpSpPr>
-      <p:sp>
-        <p:nvSpPr>
-          <p:cNvPr id="335" name="Google Shape;335;g319a528b75e_1_27"/>
-          <p:cNvSpPr txBox="1"/>
-          <p:nvPr>
-            <p:ph idx="1" type="body"/>
-          </p:nvPr>
-        </p:nvSpPr>
-        <p:spPr>
-          <a:xfrm>
-            <a:off x="8300446" y="9898295"/>
-            <a:ext cx="11193600" cy="461700"/>
-          </a:xfrm>
-          <a:prstGeom prst="rect">
-            <a:avLst/>
-          </a:prstGeom>
-          <a:noFill/>
-          <a:ln>
-            <a:noFill/>
-          </a:ln>
-        </p:spPr>
-        <p:txBody>
-          <a:bodyPr anchorCtr="0" anchor="t" bIns="0" lIns="0" spcFirstLastPara="1" rIns="0" wrap="square" tIns="0">
-            <a:spAutoFit/>
-          </a:bodyPr>
-          <a:lstStyle/>
-          <a:p>
-            <a:pPr indent="0" lvl="0" marL="0" rtl="0" algn="l">
-              <a:spcBef>
-                <a:spcPts val="0"/>
-              </a:spcBef>
-              <a:spcAft>
-                <a:spcPts val="0"/>
-              </a:spcAft>
-              <a:buNone/>
-            </a:pPr>
-            <a:r>
-              <a:rPr lang="es-CL" sz="3000"/>
-              <a:t>Muchas Gracias</a:t>
-            </a:r>
-            <a:endParaRPr sz="3000"/>
-          </a:p>
-        </p:txBody>
-      </p:sp>
-      <p:sp>
-        <p:nvSpPr>
-          <p:cNvPr id="336" name="Google Shape;336;g319a528b75e_1_27"/>
-          <p:cNvSpPr txBox="1"/>
-          <p:nvPr>
-            <p:ph type="title"/>
-          </p:nvPr>
-        </p:nvSpPr>
-        <p:spPr>
-          <a:xfrm>
-            <a:off x="1321990" y="8235994"/>
-            <a:ext cx="6048300" cy="831300"/>
-          </a:xfrm>
-          <a:prstGeom prst="rect">
-            <a:avLst/>
-          </a:prstGeom>
-          <a:noFill/>
-          <a:ln>
-            <a:noFill/>
-          </a:ln>
-        </p:spPr>
-        <p:txBody>
-          <a:bodyPr anchorCtr="0" anchor="t" bIns="0" lIns="0" spcFirstLastPara="1" rIns="0" wrap="square" tIns="0">
-            <a:spAutoFit/>
-          </a:bodyPr>
-          <a:lstStyle/>
-          <a:p>
-            <a:pPr indent="0" lvl="0" marL="0" rtl="0" algn="l">
-              <a:spcBef>
-                <a:spcPts val="0"/>
-              </a:spcBef>
-              <a:spcAft>
-                <a:spcPts val="0"/>
-              </a:spcAft>
-              <a:buNone/>
-            </a:pPr>
-            <a:r>
-              <a:rPr lang="es-CL"/>
-              <a:t>Conclusión</a:t>
-            </a:r>
-            <a:endParaRPr/>
           </a:p>
         </p:txBody>
       </p:sp>
@@ -26934,7 +26965,7 @@
                   <a:schemeClr val="lt2"/>
                 </a:solidFill>
               </a:rPr>
-              <a:t>DEV.</a:t>
+              <a:t>DEV, BBDD.</a:t>
             </a:r>
             <a:endParaRPr sz="3500">
               <a:solidFill>
@@ -27263,6 +27294,60 @@
           </a:effectLst>
         </p:spPr>
       </p:pic>
+      <p:pic>
+        <p:nvPicPr>
+          <p:cNvPr id="218" name="Google Shape;218;g31978c02ff3_0_205"/>
+          <p:cNvPicPr preferRelativeResize="0"/>
+          <p:nvPr/>
+        </p:nvPicPr>
+        <p:blipFill rotWithShape="1">
+          <a:blip r:embed="rId7">
+            <a:alphaModFix/>
+          </a:blip>
+          <a:srcRect b="26421" l="12395" r="23905" t="26421"/>
+          <a:stretch/>
+        </p:blipFill>
+        <p:spPr>
+          <a:xfrm>
+            <a:off x="14546325" y="7968950"/>
+            <a:ext cx="1730875" cy="1708499"/>
+          </a:xfrm>
+          <a:prstGeom prst="rect">
+            <a:avLst/>
+          </a:prstGeom>
+          <a:noFill/>
+          <a:ln>
+            <a:noFill/>
+          </a:ln>
+        </p:spPr>
+      </p:pic>
+      <p:pic>
+        <p:nvPicPr>
+          <p:cNvPr id="219" name="Google Shape;219;g31978c02ff3_0_205"/>
+          <p:cNvPicPr preferRelativeResize="0"/>
+          <p:nvPr/>
+        </p:nvPicPr>
+        <p:blipFill rotWithShape="1">
+          <a:blip r:embed="rId8">
+            <a:alphaModFix/>
+          </a:blip>
+          <a:srcRect b="-12473" l="0" r="-12473" t="0"/>
+          <a:stretch/>
+        </p:blipFill>
+        <p:spPr>
+          <a:xfrm>
+            <a:off x="14415650" y="5682575"/>
+            <a:ext cx="1992225" cy="1752329"/>
+          </a:xfrm>
+          <a:prstGeom prst="rect">
+            <a:avLst/>
+          </a:prstGeom>
+          <a:noFill/>
+          <a:ln>
+            <a:noFill/>
+          </a:ln>
+        </p:spPr>
+      </p:pic>
     </p:spTree>
   </p:cSld>
   <p:clrMapOvr>
@@ -27276,7 +27361,7 @@
   <p:cSld>
     <p:spTree>
       <p:nvGrpSpPr>
-        <p:cNvPr id="221" name="Shape 221"/>
+        <p:cNvPr id="223" name="Shape 223"/>
         <p:cNvGrpSpPr/>
         <p:nvPr/>
       </p:nvGrpSpPr>
@@ -27290,7 +27375,7 @@
       </p:grpSpPr>
       <p:sp>
         <p:nvSpPr>
-          <p:cNvPr id="222" name="Google Shape;222;g319a528b75e_1_7"/>
+          <p:cNvPr id="224" name="Google Shape;224;g319a528b75e_1_7"/>
           <p:cNvSpPr/>
           <p:nvPr/>
         </p:nvSpPr>
@@ -27431,7 +27516,7 @@
       </p:sp>
       <p:sp>
         <p:nvSpPr>
-          <p:cNvPr id="223" name="Google Shape;223;g319a528b75e_1_7"/>
+          <p:cNvPr id="225" name="Google Shape;225;g319a528b75e_1_7"/>
           <p:cNvSpPr/>
           <p:nvPr/>
         </p:nvSpPr>
@@ -27491,7 +27576,7 @@
       </p:sp>
       <p:sp>
         <p:nvSpPr>
-          <p:cNvPr id="224" name="Google Shape;224;g319a528b75e_1_7"/>
+          <p:cNvPr id="226" name="Google Shape;226;g319a528b75e_1_7"/>
           <p:cNvSpPr/>
           <p:nvPr/>
         </p:nvSpPr>
@@ -27609,7 +27694,7 @@
       </p:sp>
       <p:sp>
         <p:nvSpPr>
-          <p:cNvPr id="225" name="Google Shape;225;g319a528b75e_1_7"/>
+          <p:cNvPr id="227" name="Google Shape;227;g319a528b75e_1_7"/>
           <p:cNvSpPr txBox="1"/>
           <p:nvPr>
             <p:ph type="title"/>
@@ -27660,7 +27745,7 @@
   <p:cSld>
     <p:spTree>
       <p:nvGrpSpPr>
-        <p:cNvPr id="229" name="Shape 229"/>
+        <p:cNvPr id="231" name="Shape 231"/>
         <p:cNvGrpSpPr/>
         <p:nvPr/>
       </p:nvGrpSpPr>
@@ -27674,7 +27759,7 @@
       </p:grpSpPr>
       <p:sp>
         <p:nvSpPr>
-          <p:cNvPr id="230" name="Google Shape;230;g31978c02ff3_0_331"/>
+          <p:cNvPr id="232" name="Google Shape;232;g31978c02ff3_0_331"/>
           <p:cNvSpPr txBox="1"/>
           <p:nvPr>
             <p:ph type="title"/>
@@ -27718,7 +27803,7 @@
       </p:sp>
       <p:sp>
         <p:nvSpPr>
-          <p:cNvPr id="231" name="Google Shape;231;g31978c02ff3_0_331"/>
+          <p:cNvPr id="233" name="Google Shape;233;g31978c02ff3_0_331"/>
           <p:cNvSpPr/>
           <p:nvPr/>
         </p:nvSpPr>
@@ -27829,7 +27914,7 @@
   <p:cSld>
     <p:spTree>
       <p:nvGrpSpPr>
-        <p:cNvPr id="235" name="Shape 235"/>
+        <p:cNvPr id="237" name="Shape 237"/>
         <p:cNvGrpSpPr/>
         <p:nvPr/>
       </p:nvGrpSpPr>
@@ -27843,7 +27928,7 @@
       </p:grpSpPr>
       <p:sp>
         <p:nvSpPr>
-          <p:cNvPr id="236" name="Google Shape;236;g319a528b75e_1_16"/>
+          <p:cNvPr id="238" name="Google Shape;238;g319a528b75e_1_16"/>
           <p:cNvSpPr/>
           <p:nvPr/>
         </p:nvSpPr>
@@ -27897,7 +27982,7 @@
       </p:sp>
       <p:sp>
         <p:nvSpPr>
-          <p:cNvPr id="237" name="Google Shape;237;g319a528b75e_1_16"/>
+          <p:cNvPr id="239" name="Google Shape;239;g319a528b75e_1_16"/>
           <p:cNvSpPr txBox="1"/>
           <p:nvPr/>
         </p:nvSpPr>
@@ -27946,7 +28031,7 @@
       </p:sp>
       <p:sp>
         <p:nvSpPr>
-          <p:cNvPr id="238" name="Google Shape;238;g319a528b75e_1_16"/>
+          <p:cNvPr id="240" name="Google Shape;240;g319a528b75e_1_16"/>
           <p:cNvSpPr txBox="1"/>
           <p:nvPr/>
         </p:nvSpPr>
@@ -27995,7 +28080,7 @@
       </p:sp>
       <p:sp>
         <p:nvSpPr>
-          <p:cNvPr id="239" name="Google Shape;239;g319a528b75e_1_16"/>
+          <p:cNvPr id="241" name="Google Shape;241;g319a528b75e_1_16"/>
           <p:cNvSpPr/>
           <p:nvPr/>
         </p:nvSpPr>
@@ -28055,7 +28140,7 @@
       </p:sp>
       <p:sp>
         <p:nvSpPr>
-          <p:cNvPr id="240" name="Google Shape;240;g319a528b75e_1_16"/>
+          <p:cNvPr id="242" name="Google Shape;242;g319a528b75e_1_16"/>
           <p:cNvSpPr/>
           <p:nvPr/>
         </p:nvSpPr>
@@ -28175,7 +28260,7 @@
       </p:sp>
       <p:sp>
         <p:nvSpPr>
-          <p:cNvPr id="241" name="Google Shape;241;g319a528b75e_1_16"/>
+          <p:cNvPr id="243" name="Google Shape;243;g319a528b75e_1_16"/>
           <p:cNvSpPr/>
           <p:nvPr/>
         </p:nvSpPr>
@@ -28239,7 +28324,7 @@
       </p:sp>
       <p:sp>
         <p:nvSpPr>
-          <p:cNvPr id="242" name="Google Shape;242;g319a528b75e_1_16"/>
+          <p:cNvPr id="244" name="Google Shape;244;g319a528b75e_1_16"/>
           <p:cNvSpPr/>
           <p:nvPr/>
         </p:nvSpPr>
@@ -28314,7 +28399,7 @@
   <p:cSld>
     <p:spTree>
       <p:nvGrpSpPr>
-        <p:cNvPr id="246" name="Shape 246"/>
+        <p:cNvPr id="248" name="Shape 248"/>
         <p:cNvGrpSpPr/>
         <p:nvPr/>
       </p:nvGrpSpPr>
@@ -28328,7 +28413,7 @@
       </p:grpSpPr>
       <p:sp>
         <p:nvSpPr>
-          <p:cNvPr id="247" name="Google Shape;247;g31978c02ff3_0_322"/>
+          <p:cNvPr id="249" name="Google Shape;249;g31978c02ff3_0_322"/>
           <p:cNvSpPr txBox="1"/>
           <p:nvPr>
             <p:ph type="title"/>
@@ -28372,7 +28457,7 @@
       </p:sp>
       <p:sp>
         <p:nvSpPr>
-          <p:cNvPr id="248" name="Google Shape;248;g31978c02ff3_0_322"/>
+          <p:cNvPr id="250" name="Google Shape;250;g31978c02ff3_0_322"/>
           <p:cNvSpPr/>
           <p:nvPr/>
         </p:nvSpPr>
@@ -28467,7 +28552,7 @@
   <p:cSld>
     <p:spTree>
       <p:nvGrpSpPr>
-        <p:cNvPr id="252" name="Shape 252"/>
+        <p:cNvPr id="254" name="Shape 254"/>
         <p:cNvGrpSpPr/>
         <p:nvPr/>
       </p:nvGrpSpPr>
@@ -28481,7 +28566,7 @@
       </p:grpSpPr>
       <p:sp>
         <p:nvSpPr>
-          <p:cNvPr id="253" name="Google Shape;253;g31978c02ff3_0_221"/>
+          <p:cNvPr id="255" name="Google Shape;255;g31978c02ff3_0_221"/>
           <p:cNvSpPr txBox="1"/>
           <p:nvPr>
             <p:ph idx="1" type="body"/>
@@ -28525,12 +28610,12 @@
       </p:sp>
       <p:pic>
         <p:nvPicPr>
-          <p:cNvPr id="254" name="Google Shape;254;g31978c02ff3_0_221"/>
+          <p:cNvPr id="256" name="Google Shape;256;g31978c02ff3_0_221"/>
           <p:cNvPicPr preferRelativeResize="0"/>
           <p:nvPr/>
         </p:nvPicPr>
         <p:blipFill>
-          <a:blip r:embed="rId3">
+          <a:blip r:embed="rId4">
             <a:alphaModFix/>
           </a:blip>
           <a:stretch>
@@ -28539,8 +28624,8 @@
         </p:blipFill>
         <p:spPr>
           <a:xfrm>
-            <a:off x="1195275" y="2087050"/>
-            <a:ext cx="17713549" cy="8086300"/>
+            <a:off x="403912" y="2073500"/>
+            <a:ext cx="19448677" cy="8374574"/>
           </a:xfrm>
           <a:prstGeom prst="rect">
             <a:avLst/>
@@ -28564,7 +28649,7 @@
   <p:cSld>
     <p:spTree>
       <p:nvGrpSpPr>
-        <p:cNvPr id="258" name="Shape 258"/>
+        <p:cNvPr id="260" name="Shape 260"/>
         <p:cNvGrpSpPr/>
         <p:nvPr/>
       </p:nvGrpSpPr>
@@ -28578,14 +28663,14 @@
       </p:grpSpPr>
       <p:sp>
         <p:nvSpPr>
-          <p:cNvPr id="259" name="Google Shape;259;g31978c02ff3_0_277"/>
+          <p:cNvPr id="261" name="Google Shape;261;g31978c02ff3_0_277"/>
           <p:cNvSpPr/>
           <p:nvPr/>
         </p:nvSpPr>
         <p:spPr>
           <a:xfrm>
-            <a:off x="1658663" y="673750"/>
-            <a:ext cx="6298800" cy="5343600"/>
+            <a:off x="1658675" y="673750"/>
+            <a:ext cx="6298800" cy="6350100"/>
           </a:xfrm>
           <a:prstGeom prst="round2DiagRect">
             <a:avLst>
@@ -28635,14 +28720,14 @@
       </p:sp>
       <p:sp>
         <p:nvSpPr>
-          <p:cNvPr id="260" name="Google Shape;260;g31978c02ff3_0_277"/>
+          <p:cNvPr id="262" name="Google Shape;262;g31978c02ff3_0_277"/>
           <p:cNvSpPr/>
           <p:nvPr/>
         </p:nvSpPr>
         <p:spPr>
           <a:xfrm>
             <a:off x="9809750" y="673750"/>
-            <a:ext cx="6441600" cy="5907600"/>
+            <a:ext cx="6707700" cy="5907600"/>
           </a:xfrm>
           <a:prstGeom prst="round2DiagRect">
             <a:avLst>
@@ -28692,7 +28777,7 @@
       </p:sp>
       <p:sp>
         <p:nvSpPr>
-          <p:cNvPr id="261" name="Google Shape;261;g31978c02ff3_0_277"/>
+          <p:cNvPr id="263" name="Google Shape;263;g31978c02ff3_0_277"/>
           <p:cNvSpPr txBox="1"/>
           <p:nvPr>
             <p:ph type="title"/>
@@ -28736,7 +28821,7 @@
       </p:sp>
       <p:sp>
         <p:nvSpPr>
-          <p:cNvPr id="262" name="Google Shape;262;g31978c02ff3_0_277"/>
+          <p:cNvPr id="264" name="Google Shape;264;g31978c02ff3_0_277"/>
           <p:cNvSpPr txBox="1"/>
           <p:nvPr/>
         </p:nvSpPr>
@@ -28777,7 +28862,7 @@
             </a:pPr>
             <a:r>
               <a:rPr b="1" lang="es-CL" sz="2500"/>
-              <a:t>Bases de Datos / BaaS</a:t>
+              <a:t>Bases de Datos / backend con servicios</a:t>
             </a:r>
             <a:endParaRPr b="1" sz="2500"/>
           </a:p>
@@ -28966,18 +29051,14 @@
             </a:endParaRPr>
           </a:p>
           <a:p>
-            <a:pPr indent="-527050" lvl="0" marL="749300" rtl="0" algn="l">
-              <a:spcBef>
-                <a:spcPts val="0"/>
-              </a:spcBef>
-              <a:spcAft>
-                <a:spcPts val="0"/>
-              </a:spcAft>
-              <a:buClr>
-                <a:schemeClr val="dk1"/>
-              </a:buClr>
-              <a:buSzPts val="2500"/>
-              <a:buChar char="●"/>
+            <a:pPr indent="0" lvl="0" marL="749300" rtl="0" algn="l">
+              <a:spcBef>
+                <a:spcPts val="0"/>
+              </a:spcBef>
+              <a:spcAft>
+                <a:spcPts val="0"/>
+              </a:spcAft>
+              <a:buNone/>
             </a:pPr>
             <a:r>
               <a:t/>
@@ -29089,14 +29170,14 @@
       </p:sp>
       <p:sp>
         <p:nvSpPr>
-          <p:cNvPr id="263" name="Google Shape;263;g31978c02ff3_0_277"/>
+          <p:cNvPr id="265" name="Google Shape;265;g31978c02ff3_0_277"/>
           <p:cNvSpPr txBox="1"/>
           <p:nvPr/>
         </p:nvSpPr>
         <p:spPr>
           <a:xfrm>
-            <a:off x="1971269" y="955013"/>
-            <a:ext cx="6372600" cy="3479400"/>
+            <a:off x="1971275" y="955034"/>
+            <a:ext cx="6372600" cy="5907600"/>
           </a:xfrm>
           <a:prstGeom prst="rect">
             <a:avLst/>
@@ -29312,11 +29393,59 @@
             </a:r>
             <a:endParaRPr sz="2500"/>
           </a:p>
+          <a:p>
+            <a:pPr indent="0" lvl="0" marL="0" rtl="0" algn="l">
+              <a:spcBef>
+                <a:spcPts val="0"/>
+              </a:spcBef>
+              <a:spcAft>
+                <a:spcPts val="0"/>
+              </a:spcAft>
+              <a:buNone/>
+            </a:pPr>
+            <a:r>
+              <a:t/>
+            </a:r>
+            <a:endParaRPr b="1" sz="2500"/>
+          </a:p>
+          <a:p>
+            <a:pPr indent="0" lvl="0" marL="0" rtl="0" algn="l">
+              <a:spcBef>
+                <a:spcPts val="0"/>
+              </a:spcBef>
+              <a:spcAft>
+                <a:spcPts val="0"/>
+              </a:spcAft>
+              <a:buNone/>
+            </a:pPr>
+            <a:r>
+              <a:rPr b="1" lang="es-CL" sz="2500"/>
+              <a:t>Gráficos</a:t>
+            </a:r>
+            <a:endParaRPr b="1" sz="2500"/>
+          </a:p>
+          <a:p>
+            <a:pPr indent="-527050" lvl="0" marL="749300" rtl="0" algn="l">
+              <a:spcBef>
+                <a:spcPts val="0"/>
+              </a:spcBef>
+              <a:spcAft>
+                <a:spcPts val="0"/>
+              </a:spcAft>
+              <a:buSzPts val="2500"/>
+              <a:buChar char="●"/>
+            </a:pPr>
+            <a:r>
+              <a:rPr lang="es-CL" sz="2500"/>
+              <a:t>Chart.js </a:t>
+            </a:r>
+            <a:endParaRPr sz="2500"/>
+          </a:p>
         </p:txBody>
       </p:sp>
       <p:pic>
         <p:nvPicPr>
-          <p:cNvPr descr="File:Ionic Logo.svg - Wikimedia Commons" id="264" name="Google Shape;264;g31978c02ff3_0_277"/>
+          <p:cNvPr descr="File:Ionic Logo.svg - Wikimedia Commons" id="266" name="Google Shape;266;g31978c02ff3_0_277"/>
           <p:cNvPicPr preferRelativeResize="0"/>
           <p:nvPr/>
         </p:nvPicPr>
@@ -29350,7 +29479,7 @@
       </p:pic>
       <p:pic>
         <p:nvPicPr>
-          <p:cNvPr descr="Archivo:Angular full color logo.svg - Wikipedia, la enciclopedia libre" id="265" name="Google Shape;265;g31978c02ff3_0_277"/>
+          <p:cNvPr descr="Archivo:Angular full color logo.svg - Wikipedia, la enciclopedia libre" id="267" name="Google Shape;267;g31978c02ff3_0_277"/>
           <p:cNvPicPr preferRelativeResize="0"/>
           <p:nvPr/>
         </p:nvPicPr>
@@ -29384,7 +29513,7 @@
       </p:pic>
       <p:pic>
         <p:nvPicPr>
-          <p:cNvPr descr="File:Postman (software).png - Wikimedia Commons" id="266" name="Google Shape;266;g31978c02ff3_0_277"/>
+          <p:cNvPr descr="File:Postman (software).png - Wikimedia Commons" id="268" name="Google Shape;268;g31978c02ff3_0_277"/>
           <p:cNvPicPr preferRelativeResize="0"/>
           <p:nvPr/>
         </p:nvPicPr>
@@ -29418,7 +29547,7 @@
       </p:pic>
       <p:pic>
         <p:nvPicPr>
-          <p:cNvPr descr="File:Ionic Logo.svg - Wikimedia Commons" id="267" name="Google Shape;267;g31978c02ff3_0_277"/>
+          <p:cNvPr descr="File:Ionic Logo.svg - Wikimedia Commons" id="269" name="Google Shape;269;g31978c02ff3_0_277"/>
           <p:cNvPicPr preferRelativeResize="0"/>
           <p:nvPr/>
         </p:nvPicPr>
@@ -29452,7 +29581,7 @@
       </p:pic>
       <p:pic>
         <p:nvPicPr>
-          <p:cNvPr descr="File:Lucidchart-logo.svg - Wikimedia Commons" id="268" name="Google Shape;268;g31978c02ff3_0_277"/>
+          <p:cNvPr descr="File:Lucidchart-logo.svg - Wikimedia Commons" id="270" name="Google Shape;270;g31978c02ff3_0_277"/>
           <p:cNvPicPr preferRelativeResize="0"/>
           <p:nvPr/>
         </p:nvPicPr>
@@ -29486,7 +29615,7 @@
       </p:pic>
       <p:pic>
         <p:nvPicPr>
-          <p:cNvPr descr="File:Jira Logo.svg - Wikimedia Commons" id="269" name="Google Shape;269;g31978c02ff3_0_277"/>
+          <p:cNvPr descr="File:Jira Logo.svg - Wikimedia Commons" id="271" name="Google Shape;271;g31978c02ff3_0_277"/>
           <p:cNvPicPr preferRelativeResize="0"/>
           <p:nvPr/>
         </p:nvPicPr>
@@ -29520,7 +29649,7 @@
       </p:pic>
       <p:pic>
         <p:nvPicPr>
-          <p:cNvPr descr="Archivo:Firebase Logo.png - Wikipedia, la enciclopedia libre" id="270" name="Google Shape;270;g31978c02ff3_0_277"/>
+          <p:cNvPr descr="Archivo:Firebase Logo.png - Wikipedia, la enciclopedia libre" id="272" name="Google Shape;272;g31978c02ff3_0_277"/>
           <p:cNvPicPr preferRelativeResize="0"/>
           <p:nvPr/>
         </p:nvPicPr>
@@ -29555,7 +29684,7 @@
       </p:pic>
       <p:pic>
         <p:nvPicPr>
-          <p:cNvPr id="271" name="Google Shape;271;g31978c02ff3_0_277"/>
+          <p:cNvPr id="273" name="Google Shape;273;g31978c02ff3_0_277"/>
           <p:cNvPicPr preferRelativeResize="0"/>
           <p:nvPr/>
         </p:nvPicPr>
@@ -29590,7 +29719,7 @@
       </p:pic>
       <p:pic>
         <p:nvPicPr>
-          <p:cNvPr id="272" name="Google Shape;272;g31978c02ff3_0_277"/>
+          <p:cNvPr id="274" name="Google Shape;274;g31978c02ff3_0_277"/>
           <p:cNvPicPr preferRelativeResize="0"/>
           <p:nvPr/>
         </p:nvPicPr>
@@ -29604,7 +29733,7 @@
         </p:blipFill>
         <p:spPr>
           <a:xfrm>
-            <a:off x="12131025" y="4792777"/>
+            <a:off x="12213875" y="4703502"/>
             <a:ext cx="1132375" cy="440110"/>
           </a:xfrm>
           <a:prstGeom prst="rect">
@@ -29618,7 +29747,7 @@
       </p:pic>
       <p:pic>
         <p:nvPicPr>
-          <p:cNvPr id="273" name="Google Shape;273;g31978c02ff3_0_277"/>
+          <p:cNvPr id="275" name="Google Shape;275;g31978c02ff3_0_277"/>
           <p:cNvPicPr preferRelativeResize="0"/>
           <p:nvPr/>
         </p:nvPicPr>
@@ -29644,6 +29773,34 @@
           </a:ln>
         </p:spPr>
       </p:pic>
+      <p:pic>
+        <p:nvPicPr>
+          <p:cNvPr id="276" name="Google Shape;276;g31978c02ff3_0_277"/>
+          <p:cNvPicPr preferRelativeResize="0"/>
+          <p:nvPr/>
+        </p:nvPicPr>
+        <p:blipFill>
+          <a:blip r:embed="rId12">
+            <a:alphaModFix/>
+          </a:blip>
+          <a:stretch>
+            <a:fillRect/>
+          </a:stretch>
+        </p:blipFill>
+        <p:spPr>
+          <a:xfrm>
+            <a:off x="3779963" y="5888665"/>
+            <a:ext cx="1132375" cy="973960"/>
+          </a:xfrm>
+          <a:prstGeom prst="rect">
+            <a:avLst/>
+          </a:prstGeom>
+          <a:noFill/>
+          <a:ln>
+            <a:noFill/>
+          </a:ln>
+        </p:spPr>
+      </p:pic>
     </p:spTree>
   </p:cSld>
   <p:clrMapOvr>
@@ -29657,7 +29814,7 @@
   <p:cSld>
     <p:spTree>
       <p:nvGrpSpPr>
-        <p:cNvPr id="277" name="Shape 277"/>
+        <p:cNvPr id="280" name="Shape 280"/>
         <p:cNvGrpSpPr/>
         <p:nvPr/>
       </p:nvGrpSpPr>
@@ -29671,7 +29828,7 @@
       </p:grpSpPr>
       <p:sp>
         <p:nvSpPr>
-          <p:cNvPr id="278" name="Google Shape;278;g31978c02ff3_0_245"/>
+          <p:cNvPr id="281" name="Google Shape;281;g31978c02ff3_0_245"/>
           <p:cNvSpPr txBox="1"/>
           <p:nvPr>
             <p:ph idx="1" type="body"/>
@@ -29715,7 +29872,7 @@
       </p:sp>
       <p:sp>
         <p:nvSpPr>
-          <p:cNvPr id="279" name="Google Shape;279;g31978c02ff3_0_245"/>
+          <p:cNvPr id="282" name="Google Shape;282;g31978c02ff3_0_245"/>
           <p:cNvSpPr txBox="1"/>
           <p:nvPr>
             <p:ph idx="2" type="body"/>
@@ -29759,7 +29916,7 @@
       </p:sp>
       <p:pic>
         <p:nvPicPr>
-          <p:cNvPr id="280" name="Google Shape;280;g31978c02ff3_0_245"/>
+          <p:cNvPr id="283" name="Google Shape;283;g31978c02ff3_0_245"/>
           <p:cNvPicPr preferRelativeResize="0"/>
           <p:nvPr/>
         </p:nvPicPr>
@@ -29794,6 +29951,285 @@
 </file>
 
 <file path=ppt/theme/theme1.xml><?xml version="1.0" encoding="utf-8"?>
+<a:theme xmlns:a="http://schemas.openxmlformats.org/drawingml/2006/main" xmlns:r="http://schemas.openxmlformats.org/officeDocument/2006/relationships" name="Office Theme">
+  <a:themeElements>
+    <a:clrScheme name="Office">
+      <a:dk1>
+        <a:srgbClr val="000000"/>
+      </a:dk1>
+      <a:lt1>
+        <a:srgbClr val="FFFFFF"/>
+      </a:lt1>
+      <a:dk2>
+        <a:srgbClr val="1F497D"/>
+      </a:dk2>
+      <a:lt2>
+        <a:srgbClr val="EEECE1"/>
+      </a:lt2>
+      <a:accent1>
+        <a:srgbClr val="4F81BD"/>
+      </a:accent1>
+      <a:accent2>
+        <a:srgbClr val="C0504D"/>
+      </a:accent2>
+      <a:accent3>
+        <a:srgbClr val="9BBB59"/>
+      </a:accent3>
+      <a:accent4>
+        <a:srgbClr val="8064A2"/>
+      </a:accent4>
+      <a:accent5>
+        <a:srgbClr val="4BACC6"/>
+      </a:accent5>
+      <a:accent6>
+        <a:srgbClr val="F79646"/>
+      </a:accent6>
+      <a:hlink>
+        <a:srgbClr val="0000FF"/>
+      </a:hlink>
+      <a:folHlink>
+        <a:srgbClr val="800080"/>
+      </a:folHlink>
+    </a:clrScheme>
+    <a:fontScheme name="Office">
+      <a:majorFont>
+        <a:latin typeface="Arial"/>
+        <a:ea typeface=""/>
+        <a:cs typeface=""/>
+        <a:font script="Jpan" typeface="ＭＳ Ｐゴシック"/>
+        <a:font script="Hang" typeface="맑은 고딕"/>
+        <a:font script="Hans" typeface="宋体"/>
+        <a:font script="Hant" typeface="新細明體"/>
+        <a:font script="Arab" typeface="Times New Roman"/>
+        <a:font script="Hebr" typeface="Times New Roman"/>
+        <a:font script="Thai" typeface="Angsana New"/>
+        <a:font script="Ethi" typeface="Nyala"/>
+        <a:font script="Beng" typeface="Vrinda"/>
+        <a:font script="Gujr" typeface="Shruti"/>
+        <a:font script="Khmr" typeface="MoolBoran"/>
+        <a:font script="Knda" typeface="Tunga"/>
+        <a:font script="Guru" typeface="Raavi"/>
+        <a:font script="Cans" typeface="Euphemia"/>
+        <a:font script="Cher" typeface="Plantagenet Cherokee"/>
+        <a:font script="Yiii" typeface="Microsoft Yi Baiti"/>
+        <a:font script="Tibt" typeface="Microsoft Himalaya"/>
+        <a:font script="Thaa" typeface="MV Boli"/>
+        <a:font script="Deva" typeface="Mangal"/>
+        <a:font script="Telu" typeface="Gautami"/>
+        <a:font script="Taml" typeface="Latha"/>
+        <a:font script="Syrc" typeface="Estrangelo Edessa"/>
+        <a:font script="Orya" typeface="Kalinga"/>
+        <a:font script="Mlym" typeface="Kartika"/>
+        <a:font script="Laoo" typeface="DokChampa"/>
+        <a:font script="Sinh" typeface="Iskoola Pota"/>
+        <a:font script="Mong" typeface="Mongolian Baiti"/>
+        <a:font script="Viet" typeface="Times New Roman"/>
+        <a:font script="Uigh" typeface="Microsoft Uighur"/>
+        <a:font script="Geor" typeface="Sylfaen"/>
+      </a:majorFont>
+      <a:minorFont>
+        <a:latin typeface="Arial"/>
+        <a:ea typeface=""/>
+        <a:cs typeface=""/>
+        <a:font script="Jpan" typeface="ＭＳ Ｐゴシック"/>
+        <a:font script="Hang" typeface="맑은 고딕"/>
+        <a:font script="Hans" typeface="宋体"/>
+        <a:font script="Hant" typeface="新細明體"/>
+        <a:font script="Arab" typeface="Arial"/>
+        <a:font script="Hebr" typeface="Arial"/>
+        <a:font script="Thai" typeface="Cordia New"/>
+        <a:font script="Ethi" typeface="Nyala"/>
+        <a:font script="Beng" typeface="Vrinda"/>
+        <a:font script="Gujr" typeface="Shruti"/>
+        <a:font script="Khmr" typeface="DaunPenh"/>
+        <a:font script="Knda" typeface="Tunga"/>
+        <a:font script="Guru" typeface="Raavi"/>
+        <a:font script="Cans" typeface="Euphemia"/>
+        <a:font script="Cher" typeface="Plantagenet Cherokee"/>
+        <a:font script="Yiii" typeface="Microsoft Yi Baiti"/>
+        <a:font script="Tibt" typeface="Microsoft Himalaya"/>
+        <a:font script="Thaa" typeface="MV Boli"/>
+        <a:font script="Deva" typeface="Mangal"/>
+        <a:font script="Telu" typeface="Gautami"/>
+        <a:font script="Taml" typeface="Latha"/>
+        <a:font script="Syrc" typeface="Estrangelo Edessa"/>
+        <a:font script="Orya" typeface="Kalinga"/>
+        <a:font script="Mlym" typeface="Kartika"/>
+        <a:font script="Laoo" typeface="DokChampa"/>
+        <a:font script="Sinh" typeface="Iskoola Pota"/>
+        <a:font script="Mong" typeface="Mongolian Baiti"/>
+        <a:font script="Viet" typeface="Arial"/>
+        <a:font script="Uigh" typeface="Microsoft Uighur"/>
+        <a:font script="Geor" typeface="Sylfaen"/>
+      </a:minorFont>
+    </a:fontScheme>
+    <a:fmtScheme name="Office">
+      <a:fillStyleLst>
+        <a:solidFill>
+          <a:schemeClr val="phClr"/>
+        </a:solidFill>
+        <a:gradFill rotWithShape="1">
+          <a:gsLst>
+            <a:gs pos="0">
+              <a:schemeClr val="phClr">
+                <a:tint val="50000"/>
+                <a:satMod val="300000"/>
+              </a:schemeClr>
+            </a:gs>
+            <a:gs pos="35000">
+              <a:schemeClr val="phClr">
+                <a:tint val="37000"/>
+                <a:satMod val="300000"/>
+              </a:schemeClr>
+            </a:gs>
+            <a:gs pos="100000">
+              <a:schemeClr val="phClr">
+                <a:tint val="15000"/>
+                <a:satMod val="350000"/>
+              </a:schemeClr>
+            </a:gs>
+          </a:gsLst>
+          <a:lin ang="16200000" scaled="1"/>
+        </a:gradFill>
+        <a:gradFill rotWithShape="1">
+          <a:gsLst>
+            <a:gs pos="0">
+              <a:schemeClr val="phClr">
+                <a:tint val="100000"/>
+                <a:shade val="100000"/>
+                <a:satMod val="130000"/>
+              </a:schemeClr>
+            </a:gs>
+            <a:gs pos="100000">
+              <a:schemeClr val="phClr">
+                <a:tint val="50000"/>
+                <a:shade val="100000"/>
+                <a:satMod val="350000"/>
+              </a:schemeClr>
+            </a:gs>
+          </a:gsLst>
+          <a:lin ang="16200000" scaled="0"/>
+        </a:gradFill>
+      </a:fillStyleLst>
+      <a:lnStyleLst>
+        <a:ln w="9525" cap="flat" cmpd="sng" algn="ctr">
+          <a:solidFill>
+            <a:schemeClr val="phClr">
+              <a:shade val="95000"/>
+              <a:satMod val="105000"/>
+            </a:schemeClr>
+          </a:solidFill>
+          <a:prstDash val="solid"/>
+        </a:ln>
+        <a:ln w="25400" cap="flat" cmpd="sng" algn="ctr">
+          <a:solidFill>
+            <a:schemeClr val="phClr"/>
+          </a:solidFill>
+          <a:prstDash val="solid"/>
+        </a:ln>
+        <a:ln w="38100" cap="flat" cmpd="sng" algn="ctr">
+          <a:solidFill>
+            <a:schemeClr val="phClr"/>
+          </a:solidFill>
+          <a:prstDash val="solid"/>
+        </a:ln>
+      </a:lnStyleLst>
+      <a:effectStyleLst>
+        <a:effectStyle>
+          <a:effectLst>
+            <a:outerShdw blurRad="40000" dist="20000" dir="5400000" rotWithShape="0">
+              <a:srgbClr val="000000">
+                <a:alpha val="38000"/>
+              </a:srgbClr>
+            </a:outerShdw>
+          </a:effectLst>
+        </a:effectStyle>
+        <a:effectStyle>
+          <a:effectLst>
+            <a:outerShdw blurRad="40000" dist="23000" dir="5400000" rotWithShape="0">
+              <a:srgbClr val="000000">
+                <a:alpha val="35000"/>
+              </a:srgbClr>
+            </a:outerShdw>
+          </a:effectLst>
+        </a:effectStyle>
+        <a:effectStyle>
+          <a:effectLst>
+            <a:outerShdw blurRad="40000" dist="23000" dir="5400000" rotWithShape="0">
+              <a:srgbClr val="000000">
+                <a:alpha val="35000"/>
+              </a:srgbClr>
+            </a:outerShdw>
+          </a:effectLst>
+          <a:scene3d>
+            <a:camera prst="orthographicFront">
+              <a:rot lat="0" lon="0" rev="0"/>
+            </a:camera>
+            <a:lightRig rig="threePt" dir="t">
+              <a:rot lat="0" lon="0" rev="1200000"/>
+            </a:lightRig>
+          </a:scene3d>
+          <a:sp3d>
+            <a:bevelT w="63500" h="25400"/>
+          </a:sp3d>
+        </a:effectStyle>
+      </a:effectStyleLst>
+      <a:bgFillStyleLst>
+        <a:solidFill>
+          <a:schemeClr val="phClr"/>
+        </a:solidFill>
+        <a:gradFill rotWithShape="1">
+          <a:gsLst>
+            <a:gs pos="0">
+              <a:schemeClr val="phClr">
+                <a:tint val="40000"/>
+                <a:satMod val="350000"/>
+              </a:schemeClr>
+            </a:gs>
+            <a:gs pos="40000">
+              <a:schemeClr val="phClr">
+                <a:tint val="45000"/>
+                <a:shade val="99000"/>
+                <a:satMod val="350000"/>
+              </a:schemeClr>
+            </a:gs>
+            <a:gs pos="100000">
+              <a:schemeClr val="phClr">
+                <a:shade val="20000"/>
+                <a:satMod val="255000"/>
+              </a:schemeClr>
+            </a:gs>
+          </a:gsLst>
+          <a:path path="circle">
+            <a:fillToRect l="50000" t="-80000" r="50000" b="180000"/>
+          </a:path>
+        </a:gradFill>
+        <a:gradFill rotWithShape="1">
+          <a:gsLst>
+            <a:gs pos="0">
+              <a:schemeClr val="phClr">
+                <a:tint val="80000"/>
+                <a:satMod val="300000"/>
+              </a:schemeClr>
+            </a:gs>
+            <a:gs pos="100000">
+              <a:schemeClr val="phClr">
+                <a:shade val="30000"/>
+                <a:satMod val="200000"/>
+              </a:schemeClr>
+            </a:gs>
+          </a:gsLst>
+          <a:path path="circle">
+            <a:fillToRect l="50000" t="50000" r="50000" b="50000"/>
+          </a:path>
+        </a:gradFill>
+      </a:bgFillStyleLst>
+    </a:fmtScheme>
+  </a:themeElements>
+</a:theme>
+</file>
+
+<file path=ppt/theme/theme2.xml><?xml version="1.0" encoding="utf-8"?>
 <a:theme xmlns:a="http://schemas.openxmlformats.org/drawingml/2006/main" xmlns:r="http://schemas.openxmlformats.org/officeDocument/2006/relationships">
   <a:themeElements>
     <a:clrScheme name="Default">
@@ -30070,283 +30506,4 @@
     </a:fmtScheme>
   </a:themeElements>
 </a:theme>
-</file>
-
-<file path=ppt/theme/theme2.xml><?xml version="1.0" encoding="utf-8"?>
-<a:theme xmlns:a="http://schemas.openxmlformats.org/drawingml/2006/main" xmlns:r="http://schemas.openxmlformats.org/officeDocument/2006/relationships" name="Office Theme">
-  <a:themeElements>
-    <a:clrScheme name="Office">
-      <a:dk1>
-        <a:srgbClr val="000000"/>
-      </a:dk1>
-      <a:lt1>
-        <a:srgbClr val="FFFFFF"/>
-      </a:lt1>
-      <a:dk2>
-        <a:srgbClr val="1F497D"/>
-      </a:dk2>
-      <a:lt2>
-        <a:srgbClr val="EEECE1"/>
-      </a:lt2>
-      <a:accent1>
-        <a:srgbClr val="4F81BD"/>
-      </a:accent1>
-      <a:accent2>
-        <a:srgbClr val="C0504D"/>
-      </a:accent2>
-      <a:accent3>
-        <a:srgbClr val="9BBB59"/>
-      </a:accent3>
-      <a:accent4>
-        <a:srgbClr val="8064A2"/>
-      </a:accent4>
-      <a:accent5>
-        <a:srgbClr val="4BACC6"/>
-      </a:accent5>
-      <a:accent6>
-        <a:srgbClr val="F79646"/>
-      </a:accent6>
-      <a:hlink>
-        <a:srgbClr val="0000FF"/>
-      </a:hlink>
-      <a:folHlink>
-        <a:srgbClr val="800080"/>
-      </a:folHlink>
-    </a:clrScheme>
-    <a:fontScheme name="Office">
-      <a:majorFont>
-        <a:latin typeface="Arial"/>
-        <a:ea typeface=""/>
-        <a:cs typeface=""/>
-        <a:font script="Jpan" typeface="ＭＳ Ｐゴシック"/>
-        <a:font script="Hang" typeface="맑은 고딕"/>
-        <a:font script="Hans" typeface="宋体"/>
-        <a:font script="Hant" typeface="新細明體"/>
-        <a:font script="Arab" typeface="Times New Roman"/>
-        <a:font script="Hebr" typeface="Times New Roman"/>
-        <a:font script="Thai" typeface="Angsana New"/>
-        <a:font script="Ethi" typeface="Nyala"/>
-        <a:font script="Beng" typeface="Vrinda"/>
-        <a:font script="Gujr" typeface="Shruti"/>
-        <a:font script="Khmr" typeface="MoolBoran"/>
-        <a:font script="Knda" typeface="Tunga"/>
-        <a:font script="Guru" typeface="Raavi"/>
-        <a:font script="Cans" typeface="Euphemia"/>
-        <a:font script="Cher" typeface="Plantagenet Cherokee"/>
-        <a:font script="Yiii" typeface="Microsoft Yi Baiti"/>
-        <a:font script="Tibt" typeface="Microsoft Himalaya"/>
-        <a:font script="Thaa" typeface="MV Boli"/>
-        <a:font script="Deva" typeface="Mangal"/>
-        <a:font script="Telu" typeface="Gautami"/>
-        <a:font script="Taml" typeface="Latha"/>
-        <a:font script="Syrc" typeface="Estrangelo Edessa"/>
-        <a:font script="Orya" typeface="Kalinga"/>
-        <a:font script="Mlym" typeface="Kartika"/>
-        <a:font script="Laoo" typeface="DokChampa"/>
-        <a:font script="Sinh" typeface="Iskoola Pota"/>
-        <a:font script="Mong" typeface="Mongolian Baiti"/>
-        <a:font script="Viet" typeface="Times New Roman"/>
-        <a:font script="Uigh" typeface="Microsoft Uighur"/>
-        <a:font script="Geor" typeface="Sylfaen"/>
-      </a:majorFont>
-      <a:minorFont>
-        <a:latin typeface="Arial"/>
-        <a:ea typeface=""/>
-        <a:cs typeface=""/>
-        <a:font script="Jpan" typeface="ＭＳ Ｐゴシック"/>
-        <a:font script="Hang" typeface="맑은 고딕"/>
-        <a:font script="Hans" typeface="宋体"/>
-        <a:font script="Hant" typeface="新細明體"/>
-        <a:font script="Arab" typeface="Arial"/>
-        <a:font script="Hebr" typeface="Arial"/>
-        <a:font script="Thai" typeface="Cordia New"/>
-        <a:font script="Ethi" typeface="Nyala"/>
-        <a:font script="Beng" typeface="Vrinda"/>
-        <a:font script="Gujr" typeface="Shruti"/>
-        <a:font script="Khmr" typeface="DaunPenh"/>
-        <a:font script="Knda" typeface="Tunga"/>
-        <a:font script="Guru" typeface="Raavi"/>
-        <a:font script="Cans" typeface="Euphemia"/>
-        <a:font script="Cher" typeface="Plantagenet Cherokee"/>
-        <a:font script="Yiii" typeface="Microsoft Yi Baiti"/>
-        <a:font script="Tibt" typeface="Microsoft Himalaya"/>
-        <a:font script="Thaa" typeface="MV Boli"/>
-        <a:font script="Deva" typeface="Mangal"/>
-        <a:font script="Telu" typeface="Gautami"/>
-        <a:font script="Taml" typeface="Latha"/>
-        <a:font script="Syrc" typeface="Estrangelo Edessa"/>
-        <a:font script="Orya" typeface="Kalinga"/>
-        <a:font script="Mlym" typeface="Kartika"/>
-        <a:font script="Laoo" typeface="DokChampa"/>
-        <a:font script="Sinh" typeface="Iskoola Pota"/>
-        <a:font script="Mong" typeface="Mongolian Baiti"/>
-        <a:font script="Viet" typeface="Arial"/>
-        <a:font script="Uigh" typeface="Microsoft Uighur"/>
-        <a:font script="Geor" typeface="Sylfaen"/>
-      </a:minorFont>
-    </a:fontScheme>
-    <a:fmtScheme name="Office">
-      <a:fillStyleLst>
-        <a:solidFill>
-          <a:schemeClr val="phClr"/>
-        </a:solidFill>
-        <a:gradFill rotWithShape="1">
-          <a:gsLst>
-            <a:gs pos="0">
-              <a:schemeClr val="phClr">
-                <a:tint val="50000"/>
-                <a:satMod val="300000"/>
-              </a:schemeClr>
-            </a:gs>
-            <a:gs pos="35000">
-              <a:schemeClr val="phClr">
-                <a:tint val="37000"/>
-                <a:satMod val="300000"/>
-              </a:schemeClr>
-            </a:gs>
-            <a:gs pos="100000">
-              <a:schemeClr val="phClr">
-                <a:tint val="15000"/>
-                <a:satMod val="350000"/>
-              </a:schemeClr>
-            </a:gs>
-          </a:gsLst>
-          <a:lin ang="16200000" scaled="1"/>
-        </a:gradFill>
-        <a:gradFill rotWithShape="1">
-          <a:gsLst>
-            <a:gs pos="0">
-              <a:schemeClr val="phClr">
-                <a:tint val="100000"/>
-                <a:shade val="100000"/>
-                <a:satMod val="130000"/>
-              </a:schemeClr>
-            </a:gs>
-            <a:gs pos="100000">
-              <a:schemeClr val="phClr">
-                <a:tint val="50000"/>
-                <a:shade val="100000"/>
-                <a:satMod val="350000"/>
-              </a:schemeClr>
-            </a:gs>
-          </a:gsLst>
-          <a:lin ang="16200000" scaled="0"/>
-        </a:gradFill>
-      </a:fillStyleLst>
-      <a:lnStyleLst>
-        <a:ln w="9525" cap="flat" cmpd="sng" algn="ctr">
-          <a:solidFill>
-            <a:schemeClr val="phClr">
-              <a:shade val="95000"/>
-              <a:satMod val="105000"/>
-            </a:schemeClr>
-          </a:solidFill>
-          <a:prstDash val="solid"/>
-        </a:ln>
-        <a:ln w="25400" cap="flat" cmpd="sng" algn="ctr">
-          <a:solidFill>
-            <a:schemeClr val="phClr"/>
-          </a:solidFill>
-          <a:prstDash val="solid"/>
-        </a:ln>
-        <a:ln w="38100" cap="flat" cmpd="sng" algn="ctr">
-          <a:solidFill>
-            <a:schemeClr val="phClr"/>
-          </a:solidFill>
-          <a:prstDash val="solid"/>
-        </a:ln>
-      </a:lnStyleLst>
-      <a:effectStyleLst>
-        <a:effectStyle>
-          <a:effectLst>
-            <a:outerShdw blurRad="40000" dist="20000" dir="5400000" rotWithShape="0">
-              <a:srgbClr val="000000">
-                <a:alpha val="38000"/>
-              </a:srgbClr>
-            </a:outerShdw>
-          </a:effectLst>
-        </a:effectStyle>
-        <a:effectStyle>
-          <a:effectLst>
-            <a:outerShdw blurRad="40000" dist="23000" dir="5400000" rotWithShape="0">
-              <a:srgbClr val="000000">
-                <a:alpha val="35000"/>
-              </a:srgbClr>
-            </a:outerShdw>
-          </a:effectLst>
-        </a:effectStyle>
-        <a:effectStyle>
-          <a:effectLst>
-            <a:outerShdw blurRad="40000" dist="23000" dir="5400000" rotWithShape="0">
-              <a:srgbClr val="000000">
-                <a:alpha val="35000"/>
-              </a:srgbClr>
-            </a:outerShdw>
-          </a:effectLst>
-          <a:scene3d>
-            <a:camera prst="orthographicFront">
-              <a:rot lat="0" lon="0" rev="0"/>
-            </a:camera>
-            <a:lightRig rig="threePt" dir="t">
-              <a:rot lat="0" lon="0" rev="1200000"/>
-            </a:lightRig>
-          </a:scene3d>
-          <a:sp3d>
-            <a:bevelT w="63500" h="25400"/>
-          </a:sp3d>
-        </a:effectStyle>
-      </a:effectStyleLst>
-      <a:bgFillStyleLst>
-        <a:solidFill>
-          <a:schemeClr val="phClr"/>
-        </a:solidFill>
-        <a:gradFill rotWithShape="1">
-          <a:gsLst>
-            <a:gs pos="0">
-              <a:schemeClr val="phClr">
-                <a:tint val="40000"/>
-                <a:satMod val="350000"/>
-              </a:schemeClr>
-            </a:gs>
-            <a:gs pos="40000">
-              <a:schemeClr val="phClr">
-                <a:tint val="45000"/>
-                <a:shade val="99000"/>
-                <a:satMod val="350000"/>
-              </a:schemeClr>
-            </a:gs>
-            <a:gs pos="100000">
-              <a:schemeClr val="phClr">
-                <a:shade val="20000"/>
-                <a:satMod val="255000"/>
-              </a:schemeClr>
-            </a:gs>
-          </a:gsLst>
-          <a:path path="circle">
-            <a:fillToRect l="50000" t="-80000" r="50000" b="180000"/>
-          </a:path>
-        </a:gradFill>
-        <a:gradFill rotWithShape="1">
-          <a:gsLst>
-            <a:gs pos="0">
-              <a:schemeClr val="phClr">
-                <a:tint val="80000"/>
-                <a:satMod val="300000"/>
-              </a:schemeClr>
-            </a:gs>
-            <a:gs pos="100000">
-              <a:schemeClr val="phClr">
-                <a:shade val="30000"/>
-                <a:satMod val="200000"/>
-              </a:schemeClr>
-            </a:gs>
-          </a:gsLst>
-          <a:path path="circle">
-            <a:fillToRect l="50000" t="50000" r="50000" b="50000"/>
-          </a:path>
-        </a:gradFill>
-      </a:bgFillStyleLst>
-    </a:fmtScheme>
-  </a:themeElements>
-</a:theme>
 </file>
</xml_diff>